<commit_message>
Add more placeholder slides.
</commit_message>
<xml_diff>
--- a/Patterns/docs/Factory Method.pptx
+++ b/Patterns/docs/Factory Method.pptx
@@ -9,9 +9,12 @@
     <p:sldId id="257" r:id="rId3"/>
     <p:sldId id="258" r:id="rId4"/>
     <p:sldId id="259" r:id="rId5"/>
-    <p:sldId id="260" r:id="rId6"/>
-    <p:sldId id="261" r:id="rId7"/>
-    <p:sldId id="262" r:id="rId8"/>
+    <p:sldId id="265" r:id="rId6"/>
+    <p:sldId id="260" r:id="rId7"/>
+    <p:sldId id="263" r:id="rId8"/>
+    <p:sldId id="264" r:id="rId9"/>
+    <p:sldId id="261" r:id="rId10"/>
+    <p:sldId id="262" r:id="rId11"/>
   </p:sldIdLst>
   <p:sldSz cx="12192000" cy="6858000"/>
   <p:notesSz cx="6858000" cy="9144000"/>
@@ -249,7 +252,7 @@
           <a:p>
             <a:fld id="{8930E2FF-5471-4429-9B2F-C417631CDB23}" type="datetimeFigureOut">
               <a:rPr lang="en-GB" smtClean="0"/>
-              <a:t>03/07/2014</a:t>
+              <a:t>11/07/2014</a:t>
             </a:fld>
             <a:endParaRPr lang="en-GB"/>
           </a:p>
@@ -419,7 +422,7 @@
           <a:p>
             <a:fld id="{8930E2FF-5471-4429-9B2F-C417631CDB23}" type="datetimeFigureOut">
               <a:rPr lang="en-GB" smtClean="0"/>
-              <a:t>03/07/2014</a:t>
+              <a:t>11/07/2014</a:t>
             </a:fld>
             <a:endParaRPr lang="en-GB"/>
           </a:p>
@@ -599,7 +602,7 @@
           <a:p>
             <a:fld id="{8930E2FF-5471-4429-9B2F-C417631CDB23}" type="datetimeFigureOut">
               <a:rPr lang="en-GB" smtClean="0"/>
-              <a:t>03/07/2014</a:t>
+              <a:t>11/07/2014</a:t>
             </a:fld>
             <a:endParaRPr lang="en-GB"/>
           </a:p>
@@ -769,7 +772,7 @@
           <a:p>
             <a:fld id="{8930E2FF-5471-4429-9B2F-C417631CDB23}" type="datetimeFigureOut">
               <a:rPr lang="en-GB" smtClean="0"/>
-              <a:t>03/07/2014</a:t>
+              <a:t>11/07/2014</a:t>
             </a:fld>
             <a:endParaRPr lang="en-GB"/>
           </a:p>
@@ -1015,7 +1018,7 @@
           <a:p>
             <a:fld id="{8930E2FF-5471-4429-9B2F-C417631CDB23}" type="datetimeFigureOut">
               <a:rPr lang="en-GB" smtClean="0"/>
-              <a:t>03/07/2014</a:t>
+              <a:t>11/07/2014</a:t>
             </a:fld>
             <a:endParaRPr lang="en-GB"/>
           </a:p>
@@ -1247,7 +1250,7 @@
           <a:p>
             <a:fld id="{8930E2FF-5471-4429-9B2F-C417631CDB23}" type="datetimeFigureOut">
               <a:rPr lang="en-GB" smtClean="0"/>
-              <a:t>03/07/2014</a:t>
+              <a:t>11/07/2014</a:t>
             </a:fld>
             <a:endParaRPr lang="en-GB"/>
           </a:p>
@@ -1614,7 +1617,7 @@
           <a:p>
             <a:fld id="{8930E2FF-5471-4429-9B2F-C417631CDB23}" type="datetimeFigureOut">
               <a:rPr lang="en-GB" smtClean="0"/>
-              <a:t>03/07/2014</a:t>
+              <a:t>11/07/2014</a:t>
             </a:fld>
             <a:endParaRPr lang="en-GB"/>
           </a:p>
@@ -1732,7 +1735,7 @@
           <a:p>
             <a:fld id="{8930E2FF-5471-4429-9B2F-C417631CDB23}" type="datetimeFigureOut">
               <a:rPr lang="en-GB" smtClean="0"/>
-              <a:t>03/07/2014</a:t>
+              <a:t>11/07/2014</a:t>
             </a:fld>
             <a:endParaRPr lang="en-GB"/>
           </a:p>
@@ -1827,7 +1830,7 @@
           <a:p>
             <a:fld id="{8930E2FF-5471-4429-9B2F-C417631CDB23}" type="datetimeFigureOut">
               <a:rPr lang="en-GB" smtClean="0"/>
-              <a:t>03/07/2014</a:t>
+              <a:t>11/07/2014</a:t>
             </a:fld>
             <a:endParaRPr lang="en-GB"/>
           </a:p>
@@ -2104,7 +2107,7 @@
           <a:p>
             <a:fld id="{8930E2FF-5471-4429-9B2F-C417631CDB23}" type="datetimeFigureOut">
               <a:rPr lang="en-GB" smtClean="0"/>
-              <a:t>03/07/2014</a:t>
+              <a:t>11/07/2014</a:t>
             </a:fld>
             <a:endParaRPr lang="en-GB"/>
           </a:p>
@@ -2357,7 +2360,7 @@
           <a:p>
             <a:fld id="{8930E2FF-5471-4429-9B2F-C417631CDB23}" type="datetimeFigureOut">
               <a:rPr lang="en-GB" smtClean="0"/>
-              <a:t>03/07/2014</a:t>
+              <a:t>11/07/2014</a:t>
             </a:fld>
             <a:endParaRPr lang="en-GB"/>
           </a:p>
@@ -2570,7 +2573,7 @@
           <a:p>
             <a:fld id="{8930E2FF-5471-4429-9B2F-C417631CDB23}" type="datetimeFigureOut">
               <a:rPr lang="en-GB" smtClean="0"/>
-              <a:t>03/07/2014</a:t>
+              <a:t>11/07/2014</a:t>
             </a:fld>
             <a:endParaRPr lang="en-GB"/>
           </a:p>
@@ -3034,6 +3037,88 @@
 </p:sld>
 </file>
 
+<file path=ppt/slides/slide10.xml><?xml version="1.0" encoding="utf-8"?>
+<p:sld xmlns:a="http://schemas.openxmlformats.org/drawingml/2006/main" xmlns:r="http://schemas.openxmlformats.org/officeDocument/2006/relationships" xmlns:p="http://schemas.openxmlformats.org/presentationml/2006/main">
+  <p:cSld>
+    <p:spTree>
+      <p:nvGrpSpPr>
+        <p:cNvPr id="1" name=""/>
+        <p:cNvGrpSpPr/>
+        <p:nvPr/>
+      </p:nvGrpSpPr>
+      <p:grpSpPr>
+        <a:xfrm>
+          <a:off x="0" y="0"/>
+          <a:ext cx="0" cy="0"/>
+          <a:chOff x="0" y="0"/>
+          <a:chExt cx="0" cy="0"/>
+        </a:xfrm>
+      </p:grpSpPr>
+      <p:sp>
+        <p:nvSpPr>
+          <p:cNvPr id="2" name="Title 1"/>
+          <p:cNvSpPr>
+            <a:spLocks noGrp="1"/>
+          </p:cNvSpPr>
+          <p:nvPr>
+            <p:ph type="title"/>
+          </p:nvPr>
+        </p:nvSpPr>
+        <p:spPr/>
+        <p:txBody>
+          <a:bodyPr/>
+          <a:lstStyle/>
+          <a:p>
+            <a:r>
+              <a:rPr lang="en-GB" dirty="0" smtClean="0"/>
+              <a:t>Differences vs Abstract Factory Pattern</a:t>
+            </a:r>
+            <a:endParaRPr lang="en-GB" dirty="0"/>
+          </a:p>
+        </p:txBody>
+      </p:sp>
+      <p:sp>
+        <p:nvSpPr>
+          <p:cNvPr id="3" name="Content Placeholder 2"/>
+          <p:cNvSpPr>
+            <a:spLocks noGrp="1"/>
+          </p:cNvSpPr>
+          <p:nvPr>
+            <p:ph idx="1"/>
+          </p:nvPr>
+        </p:nvSpPr>
+        <p:spPr/>
+        <p:txBody>
+          <a:bodyPr/>
+          <a:lstStyle/>
+          <a:p>
+            <a:r>
+              <a:rPr lang="en-GB" dirty="0" smtClean="0"/>
+              <a:t>TODO Class vs Object</a:t>
+            </a:r>
+          </a:p>
+          <a:p>
+            <a:r>
+              <a:rPr lang="en-GB" dirty="0" smtClean="0"/>
+              <a:t>TODO Pattern is only one method rather than whole class</a:t>
+            </a:r>
+            <a:endParaRPr lang="en-GB" dirty="0"/>
+          </a:p>
+        </p:txBody>
+      </p:sp>
+    </p:spTree>
+    <p:extLst>
+      <p:ext uri="{BB962C8B-B14F-4D97-AF65-F5344CB8AC3E}">
+        <p14:creationId xmlns:p14="http://schemas.microsoft.com/office/powerpoint/2010/main" val="2491005361"/>
+      </p:ext>
+    </p:extLst>
+  </p:cSld>
+  <p:clrMapOvr>
+    <a:masterClrMapping/>
+  </p:clrMapOvr>
+</p:sld>
+</file>
+
 <file path=ppt/slides/slide2.xml><?xml version="1.0" encoding="utf-8"?>
 <p:sld xmlns:a="http://schemas.openxmlformats.org/drawingml/2006/main" xmlns:r="http://schemas.openxmlformats.org/officeDocument/2006/relationships" xmlns:p="http://schemas.openxmlformats.org/presentationml/2006/main">
   <p:cSld>
@@ -3271,25 +3356,6 @@
           </a:p>
         </p:txBody>
       </p:sp>
-      <p:sp>
-        <p:nvSpPr>
-          <p:cNvPr id="3" name="Content Placeholder 2"/>
-          <p:cNvSpPr>
-            <a:spLocks noGrp="1"/>
-          </p:cNvSpPr>
-          <p:nvPr>
-            <p:ph idx="1"/>
-          </p:nvPr>
-        </p:nvSpPr>
-        <p:spPr/>
-        <p:txBody>
-          <a:bodyPr/>
-          <a:lstStyle/>
-          <a:p>
-            <a:endParaRPr lang="en-GB" dirty="0"/>
-          </a:p>
-        </p:txBody>
-      </p:sp>
     </p:spTree>
     <p:extLst>
       <p:ext uri="{BB962C8B-B14F-4D97-AF65-F5344CB8AC3E}">
@@ -3337,7 +3403,7 @@
           <a:p>
             <a:r>
               <a:rPr lang="en-GB" dirty="0" smtClean="0"/>
-              <a:t>Factory Method Pattern</a:t>
+              <a:t>Simple Static Factory</a:t>
             </a:r>
             <a:endParaRPr lang="en-GB" dirty="0"/>
           </a:p>
@@ -3359,17 +3425,17 @@
           <a:lstStyle/>
           <a:p>
             <a:r>
-              <a:rPr lang="en-GB" dirty="0" smtClean="0"/>
+              <a:rPr lang="en-GB" smtClean="0"/>
               <a:t>TODO UML</a:t>
             </a:r>
-            <a:endParaRPr lang="en-GB" dirty="0"/>
+            <a:endParaRPr lang="en-GB"/>
           </a:p>
         </p:txBody>
       </p:sp>
     </p:spTree>
     <p:extLst>
       <p:ext uri="{BB962C8B-B14F-4D97-AF65-F5344CB8AC3E}">
-        <p14:creationId xmlns:p14="http://schemas.microsoft.com/office/powerpoint/2010/main" val="2409698249"/>
+        <p14:creationId xmlns:p14="http://schemas.microsoft.com/office/powerpoint/2010/main" val="1406060608"/>
       </p:ext>
     </p:extLst>
   </p:cSld>
@@ -3413,7 +3479,7 @@
           <a:p>
             <a:r>
               <a:rPr lang="en-GB" dirty="0" smtClean="0"/>
-              <a:t>Pros and Cons</a:t>
+              <a:t>Factory Method Pattern</a:t>
             </a:r>
             <a:endParaRPr lang="en-GB" dirty="0"/>
           </a:p>
@@ -3436,7 +3502,7 @@
           <a:p>
             <a:r>
               <a:rPr lang="en-GB" dirty="0" smtClean="0"/>
-              <a:t>TODO</a:t>
+              <a:t>TODO UML</a:t>
             </a:r>
             <a:endParaRPr lang="en-GB" dirty="0"/>
           </a:p>
@@ -3445,7 +3511,7 @@
     </p:spTree>
     <p:extLst>
       <p:ext uri="{BB962C8B-B14F-4D97-AF65-F5344CB8AC3E}">
-        <p14:creationId xmlns:p14="http://schemas.microsoft.com/office/powerpoint/2010/main" val="1664738492"/>
+        <p14:creationId xmlns:p14="http://schemas.microsoft.com/office/powerpoint/2010/main" val="2409698249"/>
       </p:ext>
     </p:extLst>
   </p:cSld>
@@ -3489,7 +3555,7 @@
           <a:p>
             <a:r>
               <a:rPr lang="en-GB" dirty="0" smtClean="0"/>
-              <a:t>Differences vs Abstract Factory Pattern</a:t>
+              <a:t>Factory Method Pattern Defined</a:t>
             </a:r>
             <a:endParaRPr lang="en-GB" dirty="0"/>
           </a:p>
@@ -3512,13 +3578,7 @@
           <a:p>
             <a:r>
               <a:rPr lang="en-GB" dirty="0" smtClean="0"/>
-              <a:t>TODO Class vs Object</a:t>
-            </a:r>
-          </a:p>
-          <a:p>
-            <a:r>
-              <a:rPr lang="en-GB" dirty="0" smtClean="0"/>
-              <a:t>TODO Only one method rather than whole</a:t>
+              <a:t>TODO UML</a:t>
             </a:r>
             <a:endParaRPr lang="en-GB" dirty="0"/>
           </a:p>
@@ -3527,7 +3587,155 @@
     </p:spTree>
     <p:extLst>
       <p:ext uri="{BB962C8B-B14F-4D97-AF65-F5344CB8AC3E}">
-        <p14:creationId xmlns:p14="http://schemas.microsoft.com/office/powerpoint/2010/main" val="2491005361"/>
+        <p14:creationId xmlns:p14="http://schemas.microsoft.com/office/powerpoint/2010/main" val="905341878"/>
+      </p:ext>
+    </p:extLst>
+  </p:cSld>
+  <p:clrMapOvr>
+    <a:masterClrMapping/>
+  </p:clrMapOvr>
+</p:sld>
+</file>
+
+<file path=ppt/slides/slide8.xml><?xml version="1.0" encoding="utf-8"?>
+<p:sld xmlns:a="http://schemas.openxmlformats.org/drawingml/2006/main" xmlns:r="http://schemas.openxmlformats.org/officeDocument/2006/relationships" xmlns:p="http://schemas.openxmlformats.org/presentationml/2006/main">
+  <p:cSld>
+    <p:spTree>
+      <p:nvGrpSpPr>
+        <p:cNvPr id="1" name=""/>
+        <p:cNvGrpSpPr/>
+        <p:nvPr/>
+      </p:nvGrpSpPr>
+      <p:grpSpPr>
+        <a:xfrm>
+          <a:off x="0" y="0"/>
+          <a:ext cx="0" cy="0"/>
+          <a:chOff x="0" y="0"/>
+          <a:chExt cx="0" cy="0"/>
+        </a:xfrm>
+      </p:grpSpPr>
+      <p:sp>
+        <p:nvSpPr>
+          <p:cNvPr id="2" name="Title 1"/>
+          <p:cNvSpPr>
+            <a:spLocks noGrp="1"/>
+          </p:cNvSpPr>
+          <p:nvPr>
+            <p:ph type="title"/>
+          </p:nvPr>
+        </p:nvSpPr>
+        <p:spPr/>
+        <p:txBody>
+          <a:bodyPr/>
+          <a:lstStyle/>
+          <a:p>
+            <a:r>
+              <a:rPr lang="en-GB" dirty="0" smtClean="0"/>
+              <a:t>Applicability</a:t>
+            </a:r>
+            <a:endParaRPr lang="en-GB" dirty="0"/>
+          </a:p>
+        </p:txBody>
+      </p:sp>
+      <p:sp>
+        <p:nvSpPr>
+          <p:cNvPr id="3" name="Content Placeholder 2"/>
+          <p:cNvSpPr>
+            <a:spLocks noGrp="1"/>
+          </p:cNvSpPr>
+          <p:nvPr>
+            <p:ph idx="1"/>
+          </p:nvPr>
+        </p:nvSpPr>
+        <p:spPr/>
+        <p:txBody>
+          <a:bodyPr/>
+          <a:lstStyle/>
+          <a:p>
+            <a:endParaRPr lang="en-GB"/>
+          </a:p>
+        </p:txBody>
+      </p:sp>
+    </p:spTree>
+    <p:extLst>
+      <p:ext uri="{BB962C8B-B14F-4D97-AF65-F5344CB8AC3E}">
+        <p14:creationId xmlns:p14="http://schemas.microsoft.com/office/powerpoint/2010/main" val="3173668914"/>
+      </p:ext>
+    </p:extLst>
+  </p:cSld>
+  <p:clrMapOvr>
+    <a:masterClrMapping/>
+  </p:clrMapOvr>
+</p:sld>
+</file>
+
+<file path=ppt/slides/slide9.xml><?xml version="1.0" encoding="utf-8"?>
+<p:sld xmlns:a="http://schemas.openxmlformats.org/drawingml/2006/main" xmlns:r="http://schemas.openxmlformats.org/officeDocument/2006/relationships" xmlns:p="http://schemas.openxmlformats.org/presentationml/2006/main">
+  <p:cSld>
+    <p:spTree>
+      <p:nvGrpSpPr>
+        <p:cNvPr id="1" name=""/>
+        <p:cNvGrpSpPr/>
+        <p:nvPr/>
+      </p:nvGrpSpPr>
+      <p:grpSpPr>
+        <a:xfrm>
+          <a:off x="0" y="0"/>
+          <a:ext cx="0" cy="0"/>
+          <a:chOff x="0" y="0"/>
+          <a:chExt cx="0" cy="0"/>
+        </a:xfrm>
+      </p:grpSpPr>
+      <p:sp>
+        <p:nvSpPr>
+          <p:cNvPr id="2" name="Title 1"/>
+          <p:cNvSpPr>
+            <a:spLocks noGrp="1"/>
+          </p:cNvSpPr>
+          <p:nvPr>
+            <p:ph type="title"/>
+          </p:nvPr>
+        </p:nvSpPr>
+        <p:spPr/>
+        <p:txBody>
+          <a:bodyPr/>
+          <a:lstStyle/>
+          <a:p>
+            <a:r>
+              <a:rPr lang="en-GB" dirty="0" smtClean="0"/>
+              <a:t>Pros and Cons</a:t>
+            </a:r>
+            <a:endParaRPr lang="en-GB" dirty="0"/>
+          </a:p>
+        </p:txBody>
+      </p:sp>
+      <p:sp>
+        <p:nvSpPr>
+          <p:cNvPr id="3" name="Content Placeholder 2"/>
+          <p:cNvSpPr>
+            <a:spLocks noGrp="1"/>
+          </p:cNvSpPr>
+          <p:nvPr>
+            <p:ph idx="1"/>
+          </p:nvPr>
+        </p:nvSpPr>
+        <p:spPr/>
+        <p:txBody>
+          <a:bodyPr/>
+          <a:lstStyle/>
+          <a:p>
+            <a:r>
+              <a:rPr lang="en-GB" dirty="0" smtClean="0"/>
+              <a:t>TODO</a:t>
+            </a:r>
+            <a:endParaRPr lang="en-GB" dirty="0"/>
+          </a:p>
+        </p:txBody>
+      </p:sp>
+    </p:spTree>
+    <p:extLst>
+      <p:ext uri="{BB962C8B-B14F-4D97-AF65-F5344CB8AC3E}">
+        <p14:creationId xmlns:p14="http://schemas.microsoft.com/office/powerpoint/2010/main" val="1664738492"/>
       </p:ext>
     </p:extLst>
   </p:cSld>

</xml_diff>

<commit_message>
Add definition to presentation.
</commit_message>
<xml_diff>
--- a/Patterns/docs/Factory Method.pptx
+++ b/Patterns/docs/Factory Method.pptx
@@ -550,15 +550,11 @@
             </a:r>
             <a:r>
               <a:rPr lang="en-GB" baseline="0" dirty="0" smtClean="0"/>
-              <a:t> could be a </a:t>
-            </a:r>
-            <a:r>
-              <a:rPr lang="en-GB" baseline="0" smtClean="0"/>
-              <a:t>static method</a:t>
-            </a:r>
-          </a:p>
-          <a:p>
-            <a:endParaRPr lang="en-GB"/>
+              <a:t> could be a static method</a:t>
+            </a:r>
+          </a:p>
+          <a:p>
+            <a:endParaRPr lang="en-GB" dirty="0"/>
           </a:p>
         </p:txBody>
       </p:sp>
@@ -3494,10 +3490,64 @@
           <a:lstStyle/>
           <a:p>
             <a:r>
-              <a:rPr lang="en-GB" dirty="0" smtClean="0"/>
-              <a:t>Design Pattern</a:t>
-            </a:r>
-            <a:endParaRPr lang="en-GB" dirty="0"/>
+              <a:rPr lang="en-GB" dirty="0" smtClean="0">
+                <a:latin typeface="+mj-lt"/>
+              </a:rPr>
+              <a:t>Design </a:t>
+            </a:r>
+            <a:r>
+              <a:rPr lang="en-GB" dirty="0" smtClean="0">
+                <a:latin typeface="+mj-lt"/>
+              </a:rPr>
+              <a:t>Pattern</a:t>
+            </a:r>
+          </a:p>
+          <a:p>
+            <a:r>
+              <a:rPr lang="en-GB" sz="1800" dirty="0" smtClean="0">
+                <a:solidFill>
+                  <a:schemeClr val="tx1">
+                    <a:lumMod val="50000"/>
+                    <a:lumOff val="50000"/>
+                  </a:schemeClr>
+                </a:solidFill>
+                <a:latin typeface="+mj-lt"/>
+              </a:rPr>
+              <a:t>Chris Drew 16</a:t>
+            </a:r>
+            <a:r>
+              <a:rPr lang="en-GB" sz="1800" baseline="30000" dirty="0" smtClean="0">
+                <a:solidFill>
+                  <a:schemeClr val="tx1">
+                    <a:lumMod val="50000"/>
+                    <a:lumOff val="50000"/>
+                  </a:schemeClr>
+                </a:solidFill>
+                <a:latin typeface="+mj-lt"/>
+              </a:rPr>
+              <a:t>th</a:t>
+            </a:r>
+            <a:r>
+              <a:rPr lang="en-GB" sz="1800" dirty="0" smtClean="0">
+                <a:solidFill>
+                  <a:schemeClr val="tx1">
+                    <a:lumMod val="50000"/>
+                    <a:lumOff val="50000"/>
+                  </a:schemeClr>
+                </a:solidFill>
+                <a:latin typeface="+mj-lt"/>
+              </a:rPr>
+              <a:t> July 2014</a:t>
+            </a:r>
+            <a:endParaRPr lang="en-GB" sz="1800" dirty="0">
+              <a:solidFill>
+                <a:schemeClr val="tx1">
+                  <a:lumMod val="50000"/>
+                  <a:lumOff val="50000"/>
+                </a:schemeClr>
+              </a:solidFill>
+              <a:latin typeface="+mj-lt"/>
+            </a:endParaRPr>
           </a:p>
         </p:txBody>
       </p:sp>
@@ -3577,42 +3627,63 @@
           <a:lstStyle/>
           <a:p>
             <a:r>
-              <a:rPr lang="en-GB" dirty="0" smtClean="0"/>
-              <a:t>Intro to </a:t>
-            </a:r>
-            <a:r>
-              <a:rPr lang="en-GB" dirty="0" err="1" smtClean="0"/>
-              <a:t>PizzaStore</a:t>
-            </a:r>
-            <a:r>
-              <a:rPr lang="en-GB" dirty="0" smtClean="0"/>
-              <a:t> with simple static factory</a:t>
-            </a:r>
-          </a:p>
-          <a:p>
-            <a:r>
-              <a:rPr lang="en-GB" dirty="0" smtClean="0"/>
+              <a:rPr lang="en-GB" dirty="0" smtClean="0">
+                <a:latin typeface="+mj-lt"/>
+              </a:rPr>
+              <a:t>Intro to PizzaStore with simple static factory</a:t>
+            </a:r>
+          </a:p>
+          <a:p>
+            <a:r>
+              <a:rPr lang="en-GB" dirty="0" smtClean="0">
+                <a:latin typeface="+mj-lt"/>
+              </a:rPr>
               <a:t>Live demo introducing factory method pattern</a:t>
             </a:r>
           </a:p>
           <a:p>
             <a:r>
-              <a:rPr lang="en-GB" dirty="0" smtClean="0"/>
-              <a:t>Look at the definition of factory method pattern</a:t>
-            </a:r>
-          </a:p>
-          <a:p>
-            <a:r>
-              <a:rPr lang="en-GB" dirty="0" smtClean="0"/>
+              <a:rPr lang="en-GB" dirty="0" smtClean="0">
+                <a:latin typeface="+mj-lt"/>
+              </a:rPr>
+              <a:t>Look at the definition of factory method </a:t>
+            </a:r>
+            <a:r>
+              <a:rPr lang="en-GB" dirty="0" smtClean="0">
+                <a:latin typeface="+mj-lt"/>
+              </a:rPr>
+              <a:t>pattern</a:t>
+            </a:r>
+          </a:p>
+          <a:p>
+            <a:r>
+              <a:rPr lang="en-GB" dirty="0" smtClean="0">
+                <a:latin typeface="+mj-lt"/>
+              </a:rPr>
+              <a:t>Applicability</a:t>
+            </a:r>
+            <a:endParaRPr lang="en-GB" dirty="0" smtClean="0">
+              <a:latin typeface="+mj-lt"/>
+            </a:endParaRPr>
+          </a:p>
+          <a:p>
+            <a:r>
+              <a:rPr lang="en-GB" dirty="0" smtClean="0">
+                <a:latin typeface="+mj-lt"/>
+              </a:rPr>
               <a:t>Pros and cons</a:t>
             </a:r>
           </a:p>
           <a:p>
             <a:r>
-              <a:rPr lang="en-GB" dirty="0" smtClean="0"/>
+              <a:rPr lang="en-GB" dirty="0" smtClean="0">
+                <a:latin typeface="+mj-lt"/>
+              </a:rPr>
               <a:t>Differences vs Abstract Factory pattern</a:t>
             </a:r>
-            <a:endParaRPr lang="en-GB" dirty="0"/>
+            <a:endParaRPr lang="en-GB" dirty="0">
+              <a:latin typeface="+mj-lt"/>
+            </a:endParaRPr>
           </a:p>
         </p:txBody>
       </p:sp>
@@ -3669,7 +3740,7 @@
           <a:lstStyle/>
           <a:p>
             <a:r>
-              <a:rPr lang="en-GB" dirty="0" err="1" smtClean="0"/>
+              <a:rPr lang="en-GB" dirty="0" smtClean="0"/>
               <a:t>PizzaStore</a:t>
             </a:r>
             <a:endParaRPr lang="en-GB" dirty="0"/>
@@ -3820,11 +3891,7 @@
           <a:p>
             <a:r>
               <a:rPr lang="en-GB" dirty="0" smtClean="0"/>
-              <a:t>Factory Method Pattern </a:t>
-            </a:r>
-            <a:r>
-              <a:rPr lang="en-GB" dirty="0" smtClean="0"/>
-              <a:t>- Example</a:t>
+              <a:t>Factory Method Pattern - Example</a:t>
             </a:r>
             <a:endParaRPr lang="en-GB" dirty="0"/>
           </a:p>
@@ -3914,16 +3981,76 @@
           <a:p>
             <a:r>
               <a:rPr lang="en-GB" dirty="0" smtClean="0"/>
-              <a:t>Factory Method Pattern </a:t>
-            </a:r>
-            <a:r>
-              <a:rPr lang="en-GB" dirty="0" smtClean="0"/>
-              <a:t>- Defined</a:t>
+              <a:t>Factory Method Pattern - Defined</a:t>
             </a:r>
             <a:endParaRPr lang="en-GB" dirty="0"/>
           </a:p>
         </p:txBody>
       </p:sp>
+      <p:sp>
+        <p:nvSpPr>
+          <p:cNvPr id="4" name="TextBox 3"/>
+          <p:cNvSpPr txBox="1"/>
+          <p:nvPr/>
+        </p:nvSpPr>
+        <p:spPr>
+          <a:xfrm>
+            <a:off x="838200" y="4849681"/>
+            <a:ext cx="10515600" cy="830997"/>
+          </a:xfrm>
+          <a:prstGeom prst="rect">
+            <a:avLst/>
+          </a:prstGeom>
+          <a:noFill/>
+        </p:spPr>
+        <p:txBody>
+          <a:bodyPr wrap="square" rtlCol="0">
+            <a:spAutoFit/>
+          </a:bodyPr>
+          <a:lstStyle/>
+          <a:p>
+            <a:r>
+              <a:rPr lang="en-GB" sz="2400" i="1" dirty="0" smtClean="0">
+                <a:latin typeface="+mj-lt"/>
+              </a:rPr>
+              <a:t>Defines an interface for creating an object, but lets subclasses decide which class to instantiate. Factory Method lets a class defer instantiation to subclasses.</a:t>
+            </a:r>
+            <a:endParaRPr lang="en-GB" sz="2400" i="1" dirty="0">
+              <a:latin typeface="+mj-lt"/>
+            </a:endParaRPr>
+          </a:p>
+        </p:txBody>
+      </p:sp>
+      <p:pic>
+        <p:nvPicPr>
+          <p:cNvPr id="5" name="Picture 4"/>
+          <p:cNvPicPr>
+            <a:picLocks noChangeAspect="1"/>
+          </p:cNvPicPr>
+          <p:nvPr/>
+        </p:nvPicPr>
+        <p:blipFill>
+          <a:blip r:embed="rId2">
+            <a:extLst>
+              <a:ext uri="{28A0092B-C50C-407E-A947-70E740481C1C}">
+                <a14:useLocalDpi xmlns:a14="http://schemas.microsoft.com/office/drawing/2010/main" val="0"/>
+              </a:ext>
+            </a:extLst>
+          </a:blip>
+          <a:stretch>
+            <a:fillRect/>
+          </a:stretch>
+        </p:blipFill>
+        <p:spPr>
+          <a:xfrm>
+            <a:off x="2275942" y="1690688"/>
+            <a:ext cx="7640116" cy="2581635"/>
+          </a:xfrm>
+          <a:prstGeom prst="rect">
+            <a:avLst/>
+          </a:prstGeom>
+        </p:spPr>
+      </p:pic>
     </p:spTree>
     <p:extLst>
       <p:ext uri="{BB962C8B-B14F-4D97-AF65-F5344CB8AC3E}">
@@ -3999,7 +4126,23 @@
           <a:bodyPr/>
           <a:lstStyle/>
           <a:p>
-            <a:endParaRPr lang="en-GB"/>
+            <a:r>
+              <a:rPr lang="en-GB" dirty="0" smtClean="0">
+                <a:latin typeface="+mj-lt"/>
+              </a:rPr>
+              <a:t>A class can’t anticipate the class of objects it must create.</a:t>
+            </a:r>
+          </a:p>
+          <a:p>
+            <a:r>
+              <a:rPr lang="en-GB" dirty="0" smtClean="0">
+                <a:latin typeface="+mj-lt"/>
+              </a:rPr>
+              <a:t>A class wants its subclasses to specify the objects it creates.</a:t>
+            </a:r>
+            <a:endParaRPr lang="en-GB" dirty="0">
+              <a:latin typeface="+mj-lt"/>
+            </a:endParaRPr>
           </a:p>
         </p:txBody>
       </p:sp>
@@ -4013,6 +4156,13 @@
   <p:clrMapOvr>
     <a:masterClrMapping/>
   </p:clrMapOvr>
+  <p:timing>
+    <p:tnLst>
+      <p:par>
+        <p:cTn id="1" dur="indefinite" restart="never" nodeType="tmRoot"/>
+      </p:par>
+    </p:tnLst>
+  </p:timing>
 </p:sld>
 </file>
 
@@ -4072,10 +4222,14 @@
           <a:lstStyle/>
           <a:p>
             <a:r>
-              <a:rPr lang="en-GB" dirty="0" smtClean="0"/>
+              <a:rPr lang="en-GB" dirty="0" smtClean="0">
+                <a:latin typeface="+mj-lt"/>
+              </a:rPr>
               <a:t>TODO</a:t>
             </a:r>
-            <a:endParaRPr lang="en-GB" dirty="0"/>
+            <a:endParaRPr lang="en-GB" dirty="0">
+              <a:latin typeface="+mj-lt"/>
+            </a:endParaRPr>
           </a:p>
         </p:txBody>
       </p:sp>
@@ -4148,24 +4302,22 @@
           <a:lstStyle/>
           <a:p>
             <a:r>
-              <a:rPr lang="en-GB" dirty="0" smtClean="0"/>
+              <a:rPr lang="en-GB" dirty="0" smtClean="0">
+                <a:latin typeface="+mj-lt"/>
+              </a:rPr>
               <a:t>TODO Class vs Object</a:t>
             </a:r>
           </a:p>
           <a:p>
             <a:r>
-              <a:rPr lang="en-GB" dirty="0" smtClean="0"/>
-              <a:t>TODO </a:t>
-            </a:r>
-            <a:r>
-              <a:rPr lang="en-GB" smtClean="0"/>
-              <a:t>Pattern is only </a:t>
-            </a:r>
-            <a:r>
-              <a:rPr lang="en-GB" dirty="0" smtClean="0"/>
-              <a:t>one method rather than whole</a:t>
-            </a:r>
-            <a:endParaRPr lang="en-GB" dirty="0"/>
+              <a:rPr lang="en-GB" dirty="0" smtClean="0">
+                <a:latin typeface="+mj-lt"/>
+              </a:rPr>
+              <a:t>TODO Pattern is only one method rather than whole</a:t>
+            </a:r>
+            <a:endParaRPr lang="en-GB" dirty="0">
+              <a:latin typeface="+mj-lt"/>
+            </a:endParaRPr>
           </a:p>
         </p:txBody>
       </p:sp>

</xml_diff>

<commit_message>
Add placeholder for links.
</commit_message>
<xml_diff>
--- a/Patterns/docs/Factory Method.pptx
+++ b/Patterns/docs/Factory Method.pptx
@@ -5,7 +5,7 @@
     <p:sldMasterId id="2147483648" r:id="rId1"/>
   </p:sldMasterIdLst>
   <p:notesMasterIdLst>
-    <p:notesMasterId r:id="rId11"/>
+    <p:notesMasterId r:id="rId12"/>
   </p:notesMasterIdLst>
   <p:sldIdLst>
     <p:sldId id="256" r:id="rId2"/>
@@ -17,6 +17,7 @@
     <p:sldId id="265" r:id="rId8"/>
     <p:sldId id="261" r:id="rId9"/>
     <p:sldId id="262" r:id="rId10"/>
+    <p:sldId id="266" r:id="rId11"/>
   </p:sldIdLst>
   <p:sldSz cx="12192000" cy="6858000"/>
   <p:notesSz cx="6858000" cy="9144000"/>
@@ -3568,6 +3569,108 @@
       </p:par>
     </p:tnLst>
   </p:timing>
+</p:sld>
+</file>
+
+<file path=ppt/slides/slide10.xml><?xml version="1.0" encoding="utf-8"?>
+<p:sld xmlns:a="http://schemas.openxmlformats.org/drawingml/2006/main" xmlns:r="http://schemas.openxmlformats.org/officeDocument/2006/relationships" xmlns:p="http://schemas.openxmlformats.org/presentationml/2006/main">
+  <p:cSld>
+    <p:spTree>
+      <p:nvGrpSpPr>
+        <p:cNvPr id="1" name=""/>
+        <p:cNvGrpSpPr/>
+        <p:nvPr/>
+      </p:nvGrpSpPr>
+      <p:grpSpPr>
+        <a:xfrm>
+          <a:off x="0" y="0"/>
+          <a:ext cx="0" cy="0"/>
+          <a:chOff x="0" y="0"/>
+          <a:chExt cx="0" cy="0"/>
+        </a:xfrm>
+      </p:grpSpPr>
+      <p:sp>
+        <p:nvSpPr>
+          <p:cNvPr id="2" name="Title 1"/>
+          <p:cNvSpPr>
+            <a:spLocks noGrp="1"/>
+          </p:cNvSpPr>
+          <p:nvPr>
+            <p:ph type="title"/>
+          </p:nvPr>
+        </p:nvSpPr>
+        <p:spPr/>
+        <p:txBody>
+          <a:bodyPr/>
+          <a:lstStyle/>
+          <a:p>
+            <a:r>
+              <a:rPr lang="en-GB" dirty="0" smtClean="0"/>
+              <a:t>References &amp; Links</a:t>
+            </a:r>
+            <a:endParaRPr lang="en-GB" dirty="0"/>
+          </a:p>
+        </p:txBody>
+      </p:sp>
+      <p:sp>
+        <p:nvSpPr>
+          <p:cNvPr id="3" name="Content Placeholder 2"/>
+          <p:cNvSpPr>
+            <a:spLocks noGrp="1"/>
+          </p:cNvSpPr>
+          <p:nvPr>
+            <p:ph idx="1"/>
+          </p:nvPr>
+        </p:nvSpPr>
+        <p:spPr/>
+        <p:txBody>
+          <a:bodyPr/>
+          <a:lstStyle/>
+          <a:p>
+            <a:r>
+              <a:rPr lang="en-GB" dirty="0" smtClean="0"/>
+              <a:t>Head First Design Patterns</a:t>
+            </a:r>
+          </a:p>
+          <a:p>
+            <a:r>
+              <a:rPr lang="en-GB" dirty="0" smtClean="0"/>
+              <a:t>Design Patterns</a:t>
+            </a:r>
+          </a:p>
+          <a:p>
+            <a:r>
+              <a:rPr lang="en-GB">
+                <a:hlinkClick r:id="rId2"/>
+              </a:rPr>
+              <a:t>https</a:t>
+            </a:r>
+            <a:r>
+              <a:rPr lang="en-GB">
+                <a:hlinkClick r:id="rId2"/>
+              </a:rPr>
+              <a:t>://</a:t>
+            </a:r>
+            <a:r>
+              <a:rPr lang="en-GB" smtClean="0">
+                <a:hlinkClick r:id="rId2"/>
+              </a:rPr>
+              <a:t>github.com/crsdrw/patterns/tree/factory_method</a:t>
+            </a:r>
+            <a:endParaRPr lang="en-GB" smtClean="0"/>
+          </a:p>
+        </p:txBody>
+      </p:sp>
+    </p:spTree>
+    <p:extLst>
+      <p:ext uri="{BB962C8B-B14F-4D97-AF65-F5344CB8AC3E}">
+        <p14:creationId xmlns:p14="http://schemas.microsoft.com/office/powerpoint/2010/main" val="1622377849"/>
+      </p:ext>
+    </p:extLst>
+  </p:cSld>
+  <p:clrMapOvr>
+    <a:masterClrMapping/>
+  </p:clrMapOvr>
 </p:sld>
 </file>
 

</xml_diff>

<commit_message>
Remove TODOs from slide deck.
</commit_message>
<xml_diff>
--- a/Patterns/docs/Factory Method.pptx
+++ b/Patterns/docs/Factory Method.pptx
@@ -206,7 +206,7 @@
           <a:p>
             <a:fld id="{3719A91D-C916-4BC3-8AC6-4EE67F652176}" type="datetimeFigureOut">
               <a:rPr lang="en-GB" smtClean="0"/>
-              <a:t>13/07/2014</a:t>
+              <a:t>14/07/2014</a:t>
             </a:fld>
             <a:endParaRPr lang="en-GB"/>
           </a:p>
@@ -595,6 +595,218 @@
 </p:notes>
 </file>
 
+<file path=ppt/notesSlides/notesSlide2.xml><?xml version="1.0" encoding="utf-8"?>
+<p:notes xmlns:a="http://schemas.openxmlformats.org/drawingml/2006/main" xmlns:r="http://schemas.openxmlformats.org/officeDocument/2006/relationships" xmlns:p="http://schemas.openxmlformats.org/presentationml/2006/main">
+  <p:cSld>
+    <p:spTree>
+      <p:nvGrpSpPr>
+        <p:cNvPr id="1" name=""/>
+        <p:cNvGrpSpPr/>
+        <p:nvPr/>
+      </p:nvGrpSpPr>
+      <p:grpSpPr>
+        <a:xfrm>
+          <a:off x="0" y="0"/>
+          <a:ext cx="0" cy="0"/>
+          <a:chOff x="0" y="0"/>
+          <a:chExt cx="0" cy="0"/>
+        </a:xfrm>
+      </p:grpSpPr>
+      <p:sp>
+        <p:nvSpPr>
+          <p:cNvPr id="2" name="Slide Image Placeholder 1"/>
+          <p:cNvSpPr>
+            <a:spLocks noGrp="1" noRot="1" noChangeAspect="1"/>
+          </p:cNvSpPr>
+          <p:nvPr>
+            <p:ph type="sldImg"/>
+          </p:nvPr>
+        </p:nvSpPr>
+        <p:spPr/>
+      </p:sp>
+      <p:sp>
+        <p:nvSpPr>
+          <p:cNvPr id="3" name="Notes Placeholder 2"/>
+          <p:cNvSpPr>
+            <a:spLocks noGrp="1"/>
+          </p:cNvSpPr>
+          <p:nvPr>
+            <p:ph type="body" idx="1"/>
+          </p:nvPr>
+        </p:nvSpPr>
+        <p:spPr/>
+        <p:txBody>
+          <a:bodyPr/>
+          <a:lstStyle/>
+          <a:p>
+            <a:r>
+              <a:rPr lang="en-GB" dirty="0" err="1" smtClean="0"/>
+              <a:t>Concrete</a:t>
+            </a:r>
+            <a:r>
+              <a:rPr lang="en-GB" baseline="0" dirty="0" err="1" smtClean="0"/>
+              <a:t>Creator’s</a:t>
+            </a:r>
+            <a:r>
+              <a:rPr lang="en-GB" baseline="0" dirty="0" smtClean="0"/>
+              <a:t> could be used in more than one class, </a:t>
+            </a:r>
+            <a:r>
+              <a:rPr lang="en-GB" baseline="0" dirty="0" err="1" smtClean="0"/>
+              <a:t>e.g</a:t>
+            </a:r>
+            <a:r>
+              <a:rPr lang="en-GB" baseline="0" dirty="0" smtClean="0"/>
+              <a:t> a parallel class hierarchy to the creator </a:t>
+            </a:r>
+            <a:r>
+              <a:rPr lang="en-GB" baseline="0" dirty="0" err="1" smtClean="0"/>
+              <a:t>heirachy</a:t>
+            </a:r>
+            <a:r>
+              <a:rPr lang="en-GB" baseline="0" dirty="0" smtClean="0"/>
+              <a:t>, that want to use the Products</a:t>
+            </a:r>
+            <a:endParaRPr lang="en-GB" dirty="0"/>
+          </a:p>
+        </p:txBody>
+      </p:sp>
+      <p:sp>
+        <p:nvSpPr>
+          <p:cNvPr id="4" name="Slide Number Placeholder 3"/>
+          <p:cNvSpPr>
+            <a:spLocks noGrp="1"/>
+          </p:cNvSpPr>
+          <p:nvPr>
+            <p:ph type="sldNum" sz="quarter" idx="10"/>
+          </p:nvPr>
+        </p:nvSpPr>
+        <p:spPr/>
+        <p:txBody>
+          <a:bodyPr/>
+          <a:lstStyle/>
+          <a:p>
+            <a:fld id="{E9305022-B285-49AC-82C4-3908CD71CB6E}" type="slidenum">
+              <a:rPr lang="en-GB" smtClean="0"/>
+              <a:t>8</a:t>
+            </a:fld>
+            <a:endParaRPr lang="en-GB"/>
+          </a:p>
+        </p:txBody>
+      </p:sp>
+    </p:spTree>
+    <p:extLst>
+      <p:ext uri="{BB962C8B-B14F-4D97-AF65-F5344CB8AC3E}">
+        <p14:creationId xmlns:p14="http://schemas.microsoft.com/office/powerpoint/2010/main" val="2242186196"/>
+      </p:ext>
+    </p:extLst>
+  </p:cSld>
+  <p:clrMapOvr>
+    <a:masterClrMapping/>
+  </p:clrMapOvr>
+</p:notes>
+</file>
+
+<file path=ppt/notesSlides/notesSlide3.xml><?xml version="1.0" encoding="utf-8"?>
+<p:notes xmlns:a="http://schemas.openxmlformats.org/drawingml/2006/main" xmlns:r="http://schemas.openxmlformats.org/officeDocument/2006/relationships" xmlns:p="http://schemas.openxmlformats.org/presentationml/2006/main">
+  <p:cSld>
+    <p:spTree>
+      <p:nvGrpSpPr>
+        <p:cNvPr id="1" name=""/>
+        <p:cNvGrpSpPr/>
+        <p:nvPr/>
+      </p:nvGrpSpPr>
+      <p:grpSpPr>
+        <a:xfrm>
+          <a:off x="0" y="0"/>
+          <a:ext cx="0" cy="0"/>
+          <a:chOff x="0" y="0"/>
+          <a:chExt cx="0" cy="0"/>
+        </a:xfrm>
+      </p:grpSpPr>
+      <p:sp>
+        <p:nvSpPr>
+          <p:cNvPr id="2" name="Slide Image Placeholder 1"/>
+          <p:cNvSpPr>
+            <a:spLocks noGrp="1" noRot="1" noChangeAspect="1"/>
+          </p:cNvSpPr>
+          <p:nvPr>
+            <p:ph type="sldImg"/>
+          </p:nvPr>
+        </p:nvSpPr>
+        <p:spPr/>
+      </p:sp>
+      <p:sp>
+        <p:nvSpPr>
+          <p:cNvPr id="3" name="Notes Placeholder 2"/>
+          <p:cNvSpPr>
+            <a:spLocks noGrp="1"/>
+          </p:cNvSpPr>
+          <p:nvPr>
+            <p:ph type="body" idx="1"/>
+          </p:nvPr>
+        </p:nvSpPr>
+        <p:spPr/>
+        <p:txBody>
+          <a:bodyPr/>
+          <a:lstStyle/>
+          <a:p>
+            <a:r>
+              <a:rPr lang="en-GB" dirty="0" smtClean="0"/>
+              <a:t>In Factory Method Pattern,</a:t>
+            </a:r>
+            <a:r>
+              <a:rPr lang="en-GB" baseline="0" dirty="0" smtClean="0"/>
+              <a:t> the rest of the Creator class can do whatever it likes but in Abstract Factory pattern the </a:t>
+            </a:r>
+            <a:r>
+              <a:rPr lang="en-GB" baseline="0" dirty="0" err="1" smtClean="0"/>
+              <a:t>AbstractFactory’s</a:t>
+            </a:r>
+            <a:r>
+              <a:rPr lang="en-GB" baseline="0" dirty="0" smtClean="0"/>
+              <a:t> whole job is to create products.</a:t>
+            </a:r>
+            <a:endParaRPr lang="en-GB" dirty="0"/>
+          </a:p>
+        </p:txBody>
+      </p:sp>
+      <p:sp>
+        <p:nvSpPr>
+          <p:cNvPr id="4" name="Slide Number Placeholder 3"/>
+          <p:cNvSpPr>
+            <a:spLocks noGrp="1"/>
+          </p:cNvSpPr>
+          <p:nvPr>
+            <p:ph type="sldNum" sz="quarter" idx="10"/>
+          </p:nvPr>
+        </p:nvSpPr>
+        <p:spPr/>
+        <p:txBody>
+          <a:bodyPr/>
+          <a:lstStyle/>
+          <a:p>
+            <a:fld id="{E9305022-B285-49AC-82C4-3908CD71CB6E}" type="slidenum">
+              <a:rPr lang="en-GB" smtClean="0"/>
+              <a:t>9</a:t>
+            </a:fld>
+            <a:endParaRPr lang="en-GB"/>
+          </a:p>
+        </p:txBody>
+      </p:sp>
+    </p:spTree>
+    <p:extLst>
+      <p:ext uri="{BB962C8B-B14F-4D97-AF65-F5344CB8AC3E}">
+        <p14:creationId xmlns:p14="http://schemas.microsoft.com/office/powerpoint/2010/main" val="3809330091"/>
+      </p:ext>
+    </p:extLst>
+  </p:cSld>
+  <p:clrMapOvr>
+    <a:masterClrMapping/>
+  </p:clrMapOvr>
+</p:notes>
+</file>
+
 <file path=ppt/slideLayouts/slideLayout1.xml><?xml version="1.0" encoding="utf-8"?>
 <p:sldLayout xmlns:a="http://schemas.openxmlformats.org/drawingml/2006/main" xmlns:r="http://schemas.openxmlformats.org/officeDocument/2006/relationships" xmlns:p="http://schemas.openxmlformats.org/presentationml/2006/main" type="title" preserve="1">
   <p:cSld name="Title Slide">
@@ -726,7 +938,7 @@
           <a:p>
             <a:fld id="{8930E2FF-5471-4429-9B2F-C417631CDB23}" type="datetimeFigureOut">
               <a:rPr lang="en-GB" smtClean="0"/>
-              <a:t>13/07/2014</a:t>
+              <a:t>14/07/2014</a:t>
             </a:fld>
             <a:endParaRPr lang="en-GB"/>
           </a:p>
@@ -896,7 +1108,7 @@
           <a:p>
             <a:fld id="{8930E2FF-5471-4429-9B2F-C417631CDB23}" type="datetimeFigureOut">
               <a:rPr lang="en-GB" smtClean="0"/>
-              <a:t>13/07/2014</a:t>
+              <a:t>14/07/2014</a:t>
             </a:fld>
             <a:endParaRPr lang="en-GB"/>
           </a:p>
@@ -1076,7 +1288,7 @@
           <a:p>
             <a:fld id="{8930E2FF-5471-4429-9B2F-C417631CDB23}" type="datetimeFigureOut">
               <a:rPr lang="en-GB" smtClean="0"/>
-              <a:t>13/07/2014</a:t>
+              <a:t>14/07/2014</a:t>
             </a:fld>
             <a:endParaRPr lang="en-GB"/>
           </a:p>
@@ -1246,7 +1458,7 @@
           <a:p>
             <a:fld id="{8930E2FF-5471-4429-9B2F-C417631CDB23}" type="datetimeFigureOut">
               <a:rPr lang="en-GB" smtClean="0"/>
-              <a:t>13/07/2014</a:t>
+              <a:t>14/07/2014</a:t>
             </a:fld>
             <a:endParaRPr lang="en-GB"/>
           </a:p>
@@ -1492,7 +1704,7 @@
           <a:p>
             <a:fld id="{8930E2FF-5471-4429-9B2F-C417631CDB23}" type="datetimeFigureOut">
               <a:rPr lang="en-GB" smtClean="0"/>
-              <a:t>13/07/2014</a:t>
+              <a:t>14/07/2014</a:t>
             </a:fld>
             <a:endParaRPr lang="en-GB"/>
           </a:p>
@@ -1724,7 +1936,7 @@
           <a:p>
             <a:fld id="{8930E2FF-5471-4429-9B2F-C417631CDB23}" type="datetimeFigureOut">
               <a:rPr lang="en-GB" smtClean="0"/>
-              <a:t>13/07/2014</a:t>
+              <a:t>14/07/2014</a:t>
             </a:fld>
             <a:endParaRPr lang="en-GB"/>
           </a:p>
@@ -2091,7 +2303,7 @@
           <a:p>
             <a:fld id="{8930E2FF-5471-4429-9B2F-C417631CDB23}" type="datetimeFigureOut">
               <a:rPr lang="en-GB" smtClean="0"/>
-              <a:t>13/07/2014</a:t>
+              <a:t>14/07/2014</a:t>
             </a:fld>
             <a:endParaRPr lang="en-GB"/>
           </a:p>
@@ -2209,7 +2421,7 @@
           <a:p>
             <a:fld id="{8930E2FF-5471-4429-9B2F-C417631CDB23}" type="datetimeFigureOut">
               <a:rPr lang="en-GB" smtClean="0"/>
-              <a:t>13/07/2014</a:t>
+              <a:t>14/07/2014</a:t>
             </a:fld>
             <a:endParaRPr lang="en-GB"/>
           </a:p>
@@ -2304,7 +2516,7 @@
           <a:p>
             <a:fld id="{8930E2FF-5471-4429-9B2F-C417631CDB23}" type="datetimeFigureOut">
               <a:rPr lang="en-GB" smtClean="0"/>
-              <a:t>13/07/2014</a:t>
+              <a:t>14/07/2014</a:t>
             </a:fld>
             <a:endParaRPr lang="en-GB"/>
           </a:p>
@@ -2581,7 +2793,7 @@
           <a:p>
             <a:fld id="{8930E2FF-5471-4429-9B2F-C417631CDB23}" type="datetimeFigureOut">
               <a:rPr lang="en-GB" smtClean="0"/>
-              <a:t>13/07/2014</a:t>
+              <a:t>14/07/2014</a:t>
             </a:fld>
             <a:endParaRPr lang="en-GB"/>
           </a:p>
@@ -2834,7 +3046,7 @@
           <a:p>
             <a:fld id="{8930E2FF-5471-4429-9B2F-C417631CDB23}" type="datetimeFigureOut">
               <a:rPr lang="en-GB" smtClean="0"/>
-              <a:t>13/07/2014</a:t>
+              <a:t>14/07/2014</a:t>
             </a:fld>
             <a:endParaRPr lang="en-GB"/>
           </a:p>
@@ -3047,7 +3259,7 @@
           <a:p>
             <a:fld id="{8930E2FF-5471-4429-9B2F-C417631CDB23}" type="datetimeFigureOut">
               <a:rPr lang="en-GB" smtClean="0"/>
-              <a:t>13/07/2014</a:t>
+              <a:t>14/07/2014</a:t>
             </a:fld>
             <a:endParaRPr lang="en-GB"/>
           </a:p>
@@ -3494,13 +3706,7 @@
               <a:rPr lang="en-GB" dirty="0" smtClean="0">
                 <a:latin typeface="+mj-lt"/>
               </a:rPr>
-              <a:t>Design </a:t>
-            </a:r>
-            <a:r>
-              <a:rPr lang="en-GB" dirty="0" smtClean="0">
-                <a:latin typeface="+mj-lt"/>
-              </a:rPr>
-              <a:t>Pattern</a:t>
+              <a:t>Design Pattern</a:t>
             </a:r>
           </a:p>
           <a:p>
@@ -3643,13 +3849,7 @@
               <a:rPr lang="en-GB">
                 <a:hlinkClick r:id="rId2"/>
               </a:rPr>
-              <a:t>https</a:t>
-            </a:r>
-            <a:r>
-              <a:rPr lang="en-GB">
-                <a:hlinkClick r:id="rId2"/>
-              </a:rPr>
-              <a:t>://</a:t>
+              <a:t>https://</a:t>
             </a:r>
             <a:r>
               <a:rPr lang="en-GB" smtClean="0">
@@ -3749,13 +3949,7 @@
               <a:rPr lang="en-GB" dirty="0" smtClean="0">
                 <a:latin typeface="+mj-lt"/>
               </a:rPr>
-              <a:t>Look at the definition of factory method </a:t>
-            </a:r>
-            <a:r>
-              <a:rPr lang="en-GB" dirty="0" smtClean="0">
-                <a:latin typeface="+mj-lt"/>
-              </a:rPr>
-              <a:t>pattern</a:t>
+              <a:t>Look at the definition of factory method pattern</a:t>
             </a:r>
           </a:p>
           <a:p>
@@ -3765,9 +3959,6 @@
               </a:rPr>
               <a:t>Applicability</a:t>
             </a:r>
-            <a:endParaRPr lang="en-GB" dirty="0" smtClean="0">
-              <a:latin typeface="+mj-lt"/>
-            </a:endParaRPr>
           </a:p>
           <a:p>
             <a:r>
@@ -4303,7 +4494,7 @@
           <a:p>
             <a:r>
               <a:rPr lang="en-GB" dirty="0" smtClean="0"/>
-              <a:t>Pros and Cons</a:t>
+              <a:t>Consequences</a:t>
             </a:r>
             <a:endParaRPr lang="en-GB" dirty="0"/>
           </a:p>
@@ -4328,7 +4519,15 @@
               <a:rPr lang="en-GB" dirty="0" smtClean="0">
                 <a:latin typeface="+mj-lt"/>
               </a:rPr>
-              <a:t>TODO</a:t>
+              <a:t>Provides hooks for subclasses</a:t>
+            </a:r>
+          </a:p>
+          <a:p>
+            <a:r>
+              <a:rPr lang="en-GB" dirty="0" smtClean="0">
+                <a:latin typeface="+mj-lt"/>
+              </a:rPr>
+              <a:t>Connects parallel class hierarchies</a:t>
             </a:r>
             <a:endParaRPr lang="en-GB" dirty="0">
               <a:latin typeface="+mj-lt"/>
@@ -4404,11 +4603,16 @@
           <a:bodyPr/>
           <a:lstStyle/>
           <a:p>
+            <a:endParaRPr lang="en-GB" dirty="0" smtClean="0">
+              <a:latin typeface="+mj-lt"/>
+            </a:endParaRPr>
+          </a:p>
+          <a:p>
             <a:r>
               <a:rPr lang="en-GB" dirty="0" smtClean="0">
                 <a:latin typeface="+mj-lt"/>
               </a:rPr>
-              <a:t>TODO Class vs Object</a:t>
+              <a:t>Abstract Factory creates a family of products</a:t>
             </a:r>
           </a:p>
           <a:p>
@@ -4416,11 +4620,46 @@
               <a:rPr lang="en-GB" dirty="0" smtClean="0">
                 <a:latin typeface="+mj-lt"/>
               </a:rPr>
-              <a:t>TODO Pattern is only one method rather than whole</a:t>
-            </a:r>
-            <a:endParaRPr lang="en-GB" dirty="0">
-              <a:latin typeface="+mj-lt"/>
-            </a:endParaRPr>
+              <a:t>Pattern </a:t>
+            </a:r>
+            <a:r>
+              <a:rPr lang="en-GB" dirty="0" smtClean="0">
+                <a:latin typeface="+mj-lt"/>
+              </a:rPr>
+              <a:t>refers to </a:t>
+            </a:r>
+            <a:r>
+              <a:rPr lang="en-GB" dirty="0" smtClean="0">
+                <a:latin typeface="+mj-lt"/>
+              </a:rPr>
+              <a:t>only </a:t>
+            </a:r>
+            <a:r>
+              <a:rPr lang="en-GB" dirty="0" smtClean="0">
+                <a:latin typeface="+mj-lt"/>
+              </a:rPr>
+              <a:t>one method rather than </a:t>
+            </a:r>
+            <a:r>
+              <a:rPr lang="en-GB" dirty="0" smtClean="0">
+                <a:latin typeface="+mj-lt"/>
+              </a:rPr>
+              <a:t>whole object</a:t>
+            </a:r>
+          </a:p>
+          <a:p>
+            <a:r>
+              <a:rPr lang="en-GB" dirty="0">
+                <a:latin typeface="+mj-lt"/>
+              </a:rPr>
+              <a:t>Class vs Object scope</a:t>
+            </a:r>
+            <a:r>
+              <a:rPr lang="en-GB" dirty="0" smtClean="0">
+                <a:latin typeface="+mj-lt"/>
+              </a:rPr>
+              <a:t>?</a:t>
+            </a:r>
           </a:p>
         </p:txBody>
       </p:sp>

</xml_diff>

<commit_message>
Forward port update to presentation.
</commit_message>
<xml_diff>
--- a/Patterns/docs/Factory Method.pptx
+++ b/Patterns/docs/Factory Method.pptx
@@ -207,7 +207,7 @@
           <a:p>
             <a:fld id="{3719A91D-C916-4BC3-8AC6-4EE67F652176}" type="datetimeFigureOut">
               <a:rPr lang="en-GB" smtClean="0"/>
-              <a:t>15/07/2014</a:t>
+              <a:t>16/07/2014</a:t>
             </a:fld>
             <a:endParaRPr lang="en-GB"/>
           </a:p>
@@ -766,11 +766,7 @@
             </a:r>
             <a:r>
               <a:rPr lang="en-GB" baseline="0" dirty="0" smtClean="0"/>
-              <a:t> whole job is to create products</a:t>
-            </a:r>
-            <a:r>
-              <a:rPr lang="en-GB" baseline="0" dirty="0" smtClean="0"/>
-              <a:t>.</a:t>
+              <a:t> whole job is to create products.</a:t>
             </a:r>
           </a:p>
           <a:p>
@@ -953,7 +949,7 @@
           <a:p>
             <a:fld id="{8930E2FF-5471-4429-9B2F-C417631CDB23}" type="datetimeFigureOut">
               <a:rPr lang="en-GB" smtClean="0"/>
-              <a:t>15/07/2014</a:t>
+              <a:t>16/07/2014</a:t>
             </a:fld>
             <a:endParaRPr lang="en-GB"/>
           </a:p>
@@ -1123,7 +1119,7 @@
           <a:p>
             <a:fld id="{8930E2FF-5471-4429-9B2F-C417631CDB23}" type="datetimeFigureOut">
               <a:rPr lang="en-GB" smtClean="0"/>
-              <a:t>15/07/2014</a:t>
+              <a:t>16/07/2014</a:t>
             </a:fld>
             <a:endParaRPr lang="en-GB"/>
           </a:p>
@@ -1303,7 +1299,7 @@
           <a:p>
             <a:fld id="{8930E2FF-5471-4429-9B2F-C417631CDB23}" type="datetimeFigureOut">
               <a:rPr lang="en-GB" smtClean="0"/>
-              <a:t>15/07/2014</a:t>
+              <a:t>16/07/2014</a:t>
             </a:fld>
             <a:endParaRPr lang="en-GB"/>
           </a:p>
@@ -1473,7 +1469,7 @@
           <a:p>
             <a:fld id="{8930E2FF-5471-4429-9B2F-C417631CDB23}" type="datetimeFigureOut">
               <a:rPr lang="en-GB" smtClean="0"/>
-              <a:t>15/07/2014</a:t>
+              <a:t>16/07/2014</a:t>
             </a:fld>
             <a:endParaRPr lang="en-GB"/>
           </a:p>
@@ -1719,7 +1715,7 @@
           <a:p>
             <a:fld id="{8930E2FF-5471-4429-9B2F-C417631CDB23}" type="datetimeFigureOut">
               <a:rPr lang="en-GB" smtClean="0"/>
-              <a:t>15/07/2014</a:t>
+              <a:t>16/07/2014</a:t>
             </a:fld>
             <a:endParaRPr lang="en-GB"/>
           </a:p>
@@ -1951,7 +1947,7 @@
           <a:p>
             <a:fld id="{8930E2FF-5471-4429-9B2F-C417631CDB23}" type="datetimeFigureOut">
               <a:rPr lang="en-GB" smtClean="0"/>
-              <a:t>15/07/2014</a:t>
+              <a:t>16/07/2014</a:t>
             </a:fld>
             <a:endParaRPr lang="en-GB"/>
           </a:p>
@@ -2318,7 +2314,7 @@
           <a:p>
             <a:fld id="{8930E2FF-5471-4429-9B2F-C417631CDB23}" type="datetimeFigureOut">
               <a:rPr lang="en-GB" smtClean="0"/>
-              <a:t>15/07/2014</a:t>
+              <a:t>16/07/2014</a:t>
             </a:fld>
             <a:endParaRPr lang="en-GB"/>
           </a:p>
@@ -2436,7 +2432,7 @@
           <a:p>
             <a:fld id="{8930E2FF-5471-4429-9B2F-C417631CDB23}" type="datetimeFigureOut">
               <a:rPr lang="en-GB" smtClean="0"/>
-              <a:t>15/07/2014</a:t>
+              <a:t>16/07/2014</a:t>
             </a:fld>
             <a:endParaRPr lang="en-GB"/>
           </a:p>
@@ -2531,7 +2527,7 @@
           <a:p>
             <a:fld id="{8930E2FF-5471-4429-9B2F-C417631CDB23}" type="datetimeFigureOut">
               <a:rPr lang="en-GB" smtClean="0"/>
-              <a:t>15/07/2014</a:t>
+              <a:t>16/07/2014</a:t>
             </a:fld>
             <a:endParaRPr lang="en-GB"/>
           </a:p>
@@ -2808,7 +2804,7 @@
           <a:p>
             <a:fld id="{8930E2FF-5471-4429-9B2F-C417631CDB23}" type="datetimeFigureOut">
               <a:rPr lang="en-GB" smtClean="0"/>
-              <a:t>15/07/2014</a:t>
+              <a:t>16/07/2014</a:t>
             </a:fld>
             <a:endParaRPr lang="en-GB"/>
           </a:p>
@@ -3061,7 +3057,7 @@
           <a:p>
             <a:fld id="{8930E2FF-5471-4429-9B2F-C417631CDB23}" type="datetimeFigureOut">
               <a:rPr lang="en-GB" smtClean="0"/>
-              <a:t>15/07/2014</a:t>
+              <a:t>16/07/2014</a:t>
             </a:fld>
             <a:endParaRPr lang="en-GB"/>
           </a:p>
@@ -3274,7 +3270,7 @@
           <a:p>
             <a:fld id="{8930E2FF-5471-4429-9B2F-C417631CDB23}" type="datetimeFigureOut">
               <a:rPr lang="en-GB" smtClean="0"/>
-              <a:t>15/07/2014</a:t>
+              <a:t>16/07/2014</a:t>
             </a:fld>
             <a:endParaRPr lang="en-GB"/>
           </a:p>
@@ -4131,8 +4127,11 @@
               <a:rPr lang="en-GB" dirty="0" smtClean="0">
                 <a:latin typeface="+mj-lt"/>
               </a:rPr>
-              <a:t>Pros and cons</a:t>
-            </a:r>
+              <a:t>Consequences</a:t>
+            </a:r>
+            <a:endParaRPr lang="en-GB" dirty="0" smtClean="0">
+              <a:latin typeface="+mj-lt"/>
+            </a:endParaRPr>
           </a:p>
           <a:p>
             <a:r>

</xml_diff>

<commit_message>
Forward port change to presentation.
</commit_message>
<xml_diff>
--- a/Patterns/docs/Factory Method.pptx
+++ b/Patterns/docs/Factory Method.pptx
@@ -207,7 +207,7 @@
           <a:p>
             <a:fld id="{3719A91D-C916-4BC3-8AC6-4EE67F652176}" type="datetimeFigureOut">
               <a:rPr lang="en-GB" smtClean="0"/>
-              <a:t>15/07/2014</a:t>
+              <a:t>16/07/2014</a:t>
             </a:fld>
             <a:endParaRPr lang="en-GB"/>
           </a:p>
@@ -766,11 +766,7 @@
             </a:r>
             <a:r>
               <a:rPr lang="en-GB" baseline="0" dirty="0" smtClean="0"/>
-              <a:t> whole job is to create products</a:t>
-            </a:r>
-            <a:r>
-              <a:rPr lang="en-GB" baseline="0" dirty="0" smtClean="0"/>
-              <a:t>.</a:t>
+              <a:t> whole job is to create products.</a:t>
             </a:r>
           </a:p>
           <a:p>
@@ -953,7 +949,7 @@
           <a:p>
             <a:fld id="{8930E2FF-5471-4429-9B2F-C417631CDB23}" type="datetimeFigureOut">
               <a:rPr lang="en-GB" smtClean="0"/>
-              <a:t>15/07/2014</a:t>
+              <a:t>16/07/2014</a:t>
             </a:fld>
             <a:endParaRPr lang="en-GB"/>
           </a:p>
@@ -1123,7 +1119,7 @@
           <a:p>
             <a:fld id="{8930E2FF-5471-4429-9B2F-C417631CDB23}" type="datetimeFigureOut">
               <a:rPr lang="en-GB" smtClean="0"/>
-              <a:t>15/07/2014</a:t>
+              <a:t>16/07/2014</a:t>
             </a:fld>
             <a:endParaRPr lang="en-GB"/>
           </a:p>
@@ -1303,7 +1299,7 @@
           <a:p>
             <a:fld id="{8930E2FF-5471-4429-9B2F-C417631CDB23}" type="datetimeFigureOut">
               <a:rPr lang="en-GB" smtClean="0"/>
-              <a:t>15/07/2014</a:t>
+              <a:t>16/07/2014</a:t>
             </a:fld>
             <a:endParaRPr lang="en-GB"/>
           </a:p>
@@ -1473,7 +1469,7 @@
           <a:p>
             <a:fld id="{8930E2FF-5471-4429-9B2F-C417631CDB23}" type="datetimeFigureOut">
               <a:rPr lang="en-GB" smtClean="0"/>
-              <a:t>15/07/2014</a:t>
+              <a:t>16/07/2014</a:t>
             </a:fld>
             <a:endParaRPr lang="en-GB"/>
           </a:p>
@@ -1719,7 +1715,7 @@
           <a:p>
             <a:fld id="{8930E2FF-5471-4429-9B2F-C417631CDB23}" type="datetimeFigureOut">
               <a:rPr lang="en-GB" smtClean="0"/>
-              <a:t>15/07/2014</a:t>
+              <a:t>16/07/2014</a:t>
             </a:fld>
             <a:endParaRPr lang="en-GB"/>
           </a:p>
@@ -1951,7 +1947,7 @@
           <a:p>
             <a:fld id="{8930E2FF-5471-4429-9B2F-C417631CDB23}" type="datetimeFigureOut">
               <a:rPr lang="en-GB" smtClean="0"/>
-              <a:t>15/07/2014</a:t>
+              <a:t>16/07/2014</a:t>
             </a:fld>
             <a:endParaRPr lang="en-GB"/>
           </a:p>
@@ -2318,7 +2314,7 @@
           <a:p>
             <a:fld id="{8930E2FF-5471-4429-9B2F-C417631CDB23}" type="datetimeFigureOut">
               <a:rPr lang="en-GB" smtClean="0"/>
-              <a:t>15/07/2014</a:t>
+              <a:t>16/07/2014</a:t>
             </a:fld>
             <a:endParaRPr lang="en-GB"/>
           </a:p>
@@ -2436,7 +2432,7 @@
           <a:p>
             <a:fld id="{8930E2FF-5471-4429-9B2F-C417631CDB23}" type="datetimeFigureOut">
               <a:rPr lang="en-GB" smtClean="0"/>
-              <a:t>15/07/2014</a:t>
+              <a:t>16/07/2014</a:t>
             </a:fld>
             <a:endParaRPr lang="en-GB"/>
           </a:p>
@@ -2531,7 +2527,7 @@
           <a:p>
             <a:fld id="{8930E2FF-5471-4429-9B2F-C417631CDB23}" type="datetimeFigureOut">
               <a:rPr lang="en-GB" smtClean="0"/>
-              <a:t>15/07/2014</a:t>
+              <a:t>16/07/2014</a:t>
             </a:fld>
             <a:endParaRPr lang="en-GB"/>
           </a:p>
@@ -2808,7 +2804,7 @@
           <a:p>
             <a:fld id="{8930E2FF-5471-4429-9B2F-C417631CDB23}" type="datetimeFigureOut">
               <a:rPr lang="en-GB" smtClean="0"/>
-              <a:t>15/07/2014</a:t>
+              <a:t>16/07/2014</a:t>
             </a:fld>
             <a:endParaRPr lang="en-GB"/>
           </a:p>
@@ -3061,7 +3057,7 @@
           <a:p>
             <a:fld id="{8930E2FF-5471-4429-9B2F-C417631CDB23}" type="datetimeFigureOut">
               <a:rPr lang="en-GB" smtClean="0"/>
-              <a:t>15/07/2014</a:t>
+              <a:t>16/07/2014</a:t>
             </a:fld>
             <a:endParaRPr lang="en-GB"/>
           </a:p>
@@ -3274,7 +3270,7 @@
           <a:p>
             <a:fld id="{8930E2FF-5471-4429-9B2F-C417631CDB23}" type="datetimeFigureOut">
               <a:rPr lang="en-GB" smtClean="0"/>
-              <a:t>15/07/2014</a:t>
+              <a:t>16/07/2014</a:t>
             </a:fld>
             <a:endParaRPr lang="en-GB"/>
           </a:p>
@@ -4131,8 +4127,11 @@
               <a:rPr lang="en-GB" dirty="0" smtClean="0">
                 <a:latin typeface="+mj-lt"/>
               </a:rPr>
-              <a:t>Pros and cons</a:t>
-            </a:r>
+              <a:t>Consequences</a:t>
+            </a:r>
+            <a:endParaRPr lang="en-GB" dirty="0" smtClean="0">
+              <a:latin typeface="+mj-lt"/>
+            </a:endParaRPr>
           </a:p>
           <a:p>
             <a:r>

</xml_diff>